<commit_message>
Vídeo para la presentación.
</commit_message>
<xml_diff>
--- a/presentacion/presentacion_miguel_indalecio_garcia_lopez.pptx
+++ b/presentacion/presentacion_miguel_indalecio_garcia_lopez.pptx
@@ -56,6 +56,7 @@
     <p:sldId id="306" r:id="rId50"/>
     <p:sldId id="307" r:id="rId51"/>
     <p:sldId id="308" r:id="rId52"/>
+    <p:sldId id="310" r:id="rId53"/>
   </p:sldIdLst>
   <p:sldSz cx="9144000" cy="6858000" type="screen4x3"/>
   <p:notesSz cx="6858000" cy="9144000"/>
@@ -339,7 +340,7 @@
             <a:fld id="{045C9ACF-B5BA-4A7D-9AFB-510D50510C08}" type="datetimeFigureOut">
               <a:rPr lang="es-ES" smtClean="0"/>
               <a:pPr/>
-              <a:t>24/05/2016</a:t>
+              <a:t>26/05/2016</a:t>
             </a:fld>
             <a:endParaRPr lang="es-ES"/>
           </a:p>
@@ -506,7 +507,7 @@
             <a:fld id="{045C9ACF-B5BA-4A7D-9AFB-510D50510C08}" type="datetimeFigureOut">
               <a:rPr lang="es-ES" smtClean="0"/>
               <a:pPr/>
-              <a:t>24/05/2016</a:t>
+              <a:t>26/05/2016</a:t>
             </a:fld>
             <a:endParaRPr lang="es-ES"/>
           </a:p>
@@ -683,7 +684,7 @@
             <a:fld id="{045C9ACF-B5BA-4A7D-9AFB-510D50510C08}" type="datetimeFigureOut">
               <a:rPr lang="es-ES" smtClean="0"/>
               <a:pPr/>
-              <a:t>24/05/2016</a:t>
+              <a:t>26/05/2016</a:t>
             </a:fld>
             <a:endParaRPr lang="es-ES"/>
           </a:p>
@@ -850,7 +851,7 @@
             <a:fld id="{045C9ACF-B5BA-4A7D-9AFB-510D50510C08}" type="datetimeFigureOut">
               <a:rPr lang="es-ES" smtClean="0"/>
               <a:pPr/>
-              <a:t>24/05/2016</a:t>
+              <a:t>26/05/2016</a:t>
             </a:fld>
             <a:endParaRPr lang="es-ES"/>
           </a:p>
@@ -1093,7 +1094,7 @@
             <a:fld id="{045C9ACF-B5BA-4A7D-9AFB-510D50510C08}" type="datetimeFigureOut">
               <a:rPr lang="es-ES" smtClean="0"/>
               <a:pPr/>
-              <a:t>24/05/2016</a:t>
+              <a:t>26/05/2016</a:t>
             </a:fld>
             <a:endParaRPr lang="es-ES"/>
           </a:p>
@@ -1378,7 +1379,7 @@
             <a:fld id="{045C9ACF-B5BA-4A7D-9AFB-510D50510C08}" type="datetimeFigureOut">
               <a:rPr lang="es-ES" smtClean="0"/>
               <a:pPr/>
-              <a:t>24/05/2016</a:t>
+              <a:t>26/05/2016</a:t>
             </a:fld>
             <a:endParaRPr lang="es-ES"/>
           </a:p>
@@ -1797,7 +1798,7 @@
             <a:fld id="{045C9ACF-B5BA-4A7D-9AFB-510D50510C08}" type="datetimeFigureOut">
               <a:rPr lang="es-ES" smtClean="0"/>
               <a:pPr/>
-              <a:t>24/05/2016</a:t>
+              <a:t>26/05/2016</a:t>
             </a:fld>
             <a:endParaRPr lang="es-ES"/>
           </a:p>
@@ -1912,7 +1913,7 @@
             <a:fld id="{045C9ACF-B5BA-4A7D-9AFB-510D50510C08}" type="datetimeFigureOut">
               <a:rPr lang="es-ES" smtClean="0"/>
               <a:pPr/>
-              <a:t>24/05/2016</a:t>
+              <a:t>26/05/2016</a:t>
             </a:fld>
             <a:endParaRPr lang="es-ES"/>
           </a:p>
@@ -2004,7 +2005,7 @@
             <a:fld id="{045C9ACF-B5BA-4A7D-9AFB-510D50510C08}" type="datetimeFigureOut">
               <a:rPr lang="es-ES" smtClean="0"/>
               <a:pPr/>
-              <a:t>24/05/2016</a:t>
+              <a:t>26/05/2016</a:t>
             </a:fld>
             <a:endParaRPr lang="es-ES"/>
           </a:p>
@@ -2278,7 +2279,7 @@
             <a:fld id="{045C9ACF-B5BA-4A7D-9AFB-510D50510C08}" type="datetimeFigureOut">
               <a:rPr lang="es-ES" smtClean="0"/>
               <a:pPr/>
-              <a:t>24/05/2016</a:t>
+              <a:t>26/05/2016</a:t>
             </a:fld>
             <a:endParaRPr lang="es-ES"/>
           </a:p>
@@ -2528,7 +2529,7 @@
             <a:fld id="{045C9ACF-B5BA-4A7D-9AFB-510D50510C08}" type="datetimeFigureOut">
               <a:rPr lang="es-ES" smtClean="0"/>
               <a:pPr/>
-              <a:t>24/05/2016</a:t>
+              <a:t>26/05/2016</a:t>
             </a:fld>
             <a:endParaRPr lang="es-ES"/>
           </a:p>
@@ -2762,7 +2763,7 @@
             <a:fld id="{045C9ACF-B5BA-4A7D-9AFB-510D50510C08}" type="datetimeFigureOut">
               <a:rPr lang="es-ES" smtClean="0"/>
               <a:pPr/>
-              <a:t>24/05/2016</a:t>
+              <a:t>26/05/2016</a:t>
             </a:fld>
             <a:endParaRPr lang="es-ES"/>
           </a:p>
@@ -3356,6 +3357,9 @@
   <p:clrMapOvr>
     <a:masterClrMapping/>
   </p:clrMapOvr>
+  <p:transition>
+    <p:newsflash/>
+  </p:transition>
   <p:timing>
     <p:tnLst>
       <p:par>
@@ -3722,6 +3726,9 @@
   <p:clrMapOvr>
     <a:masterClrMapping/>
   </p:clrMapOvr>
+  <p:transition>
+    <p:push dir="r"/>
+  </p:transition>
   <p:timing>
     <p:tnLst>
       <p:par>
@@ -4152,6 +4159,9 @@
   <p:clrMapOvr>
     <a:masterClrMapping/>
   </p:clrMapOvr>
+  <p:transition>
+    <p:push dir="r"/>
+  </p:transition>
   <p:timing>
     <p:tnLst>
       <p:par>
@@ -4759,6 +4769,9 @@
   <p:clrMapOvr>
     <a:masterClrMapping/>
   </p:clrMapOvr>
+  <p:transition>
+    <p:newsflash/>
+  </p:transition>
   <p:timing>
     <p:tnLst>
       <p:par>
@@ -5432,6 +5445,9 @@
   <p:clrMapOvr>
     <a:masterClrMapping/>
   </p:clrMapOvr>
+  <p:transition>
+    <p:push dir="r"/>
+  </p:transition>
   <p:timing>
     <p:tnLst>
       <p:par>
@@ -5727,6 +5743,9 @@
   <p:clrMapOvr>
     <a:masterClrMapping/>
   </p:clrMapOvr>
+  <p:transition>
+    <p:push dir="r"/>
+  </p:transition>
   <p:timing>
     <p:tnLst>
       <p:par>
@@ -5966,6 +5985,9 @@
   <p:clrMapOvr>
     <a:masterClrMapping/>
   </p:clrMapOvr>
+  <p:transition>
+    <p:push dir="r"/>
+  </p:transition>
   <p:timing>
     <p:tnLst>
       <p:par>
@@ -6180,6 +6202,9 @@
   <p:clrMapOvr>
     <a:masterClrMapping/>
   </p:clrMapOvr>
+  <p:transition>
+    <p:push dir="r"/>
+  </p:transition>
   <p:timing>
     <p:tnLst>
       <p:par>
@@ -6392,6 +6417,9 @@
   <p:clrMapOvr>
     <a:masterClrMapping/>
   </p:clrMapOvr>
+  <p:transition>
+    <p:push dir="r"/>
+  </p:transition>
   <p:timing>
     <p:tnLst>
       <p:par>
@@ -6893,6 +6921,9 @@
   <p:clrMapOvr>
     <a:masterClrMapping/>
   </p:clrMapOvr>
+  <p:transition>
+    <p:newsflash/>
+  </p:transition>
   <p:timing>
     <p:tnLst>
       <p:par>
@@ -7106,6 +7137,9 @@
   <p:clrMapOvr>
     <a:masterClrMapping/>
   </p:clrMapOvr>
+  <p:transition>
+    <p:newsflash/>
+  </p:transition>
   <p:timing>
     <p:tnLst>
       <p:par>
@@ -7401,6 +7435,9 @@
   <p:clrMapOvr>
     <a:masterClrMapping/>
   </p:clrMapOvr>
+  <p:transition>
+    <p:newsflash/>
+  </p:transition>
   <p:timing>
     <p:tnLst>
       <p:par>
@@ -7598,6 +7635,9 @@
   <p:clrMapOvr>
     <a:masterClrMapping/>
   </p:clrMapOvr>
+  <p:transition>
+    <p:push dir="r"/>
+  </p:transition>
   <p:timing>
     <p:tnLst>
       <p:par>
@@ -7795,6 +7835,9 @@
   <p:clrMapOvr>
     <a:masterClrMapping/>
   </p:clrMapOvr>
+  <p:transition>
+    <p:push dir="r"/>
+  </p:transition>
   <p:timing>
     <p:tnLst>
       <p:par>
@@ -7992,6 +8035,9 @@
   <p:clrMapOvr>
     <a:masterClrMapping/>
   </p:clrMapOvr>
+  <p:transition>
+    <p:push dir="r"/>
+  </p:transition>
   <p:timing>
     <p:tnLst>
       <p:par>
@@ -8189,6 +8235,9 @@
   <p:clrMapOvr>
     <a:masterClrMapping/>
   </p:clrMapOvr>
+  <p:transition>
+    <p:push dir="r"/>
+  </p:transition>
   <p:timing>
     <p:tnLst>
       <p:par>
@@ -8386,6 +8435,9 @@
   <p:clrMapOvr>
     <a:masterClrMapping/>
   </p:clrMapOvr>
+  <p:transition>
+    <p:push dir="r"/>
+  </p:transition>
   <p:timing>
     <p:tnLst>
       <p:par>
@@ -8582,6 +8634,9 @@
   <p:clrMapOvr>
     <a:masterClrMapping/>
   </p:clrMapOvr>
+  <p:transition>
+    <p:push dir="r"/>
+  </p:transition>
   <p:timing>
     <p:tnLst>
       <p:par>
@@ -8779,6 +8834,9 @@
   <p:clrMapOvr>
     <a:masterClrMapping/>
   </p:clrMapOvr>
+  <p:transition>
+    <p:push dir="r"/>
+  </p:transition>
   <p:timing>
     <p:tnLst>
       <p:par>
@@ -8976,6 +9034,9 @@
   <p:clrMapOvr>
     <a:masterClrMapping/>
   </p:clrMapOvr>
+  <p:transition>
+    <p:push dir="r"/>
+  </p:transition>
   <p:timing>
     <p:tnLst>
       <p:par>
@@ -9171,6 +9232,9 @@
   <p:clrMapOvr>
     <a:masterClrMapping/>
   </p:clrMapOvr>
+  <p:transition>
+    <p:push dir="r"/>
+  </p:transition>
   <p:timing>
     <p:tnLst>
       <p:par>
@@ -9732,6 +9796,9 @@
   <p:clrMapOvr>
     <a:masterClrMapping/>
   </p:clrMapOvr>
+  <p:transition>
+    <p:newsflash/>
+  </p:transition>
   <p:timing>
     <p:tnLst>
       <p:par>
@@ -10246,6 +10313,9 @@
   <p:clrMapOvr>
     <a:masterClrMapping/>
   </p:clrMapOvr>
+  <p:transition>
+    <p:push dir="r"/>
+  </p:transition>
   <p:timing>
     <p:tnLst>
       <p:par>
@@ -10830,6 +10900,9 @@
   <p:clrMapOvr>
     <a:masterClrMapping/>
   </p:clrMapOvr>
+  <p:transition>
+    <p:push dir="r"/>
+  </p:transition>
   <p:timing>
     <p:tnLst>
       <p:par>
@@ -11016,6 +11089,9 @@
   <p:clrMapOvr>
     <a:masterClrMapping/>
   </p:clrMapOvr>
+  <p:transition>
+    <p:newsflash/>
+  </p:transition>
   <p:timing>
     <p:tnLst>
       <p:par>
@@ -11240,6 +11316,9 @@
   <p:clrMapOvr>
     <a:masterClrMapping/>
   </p:clrMapOvr>
+  <p:transition>
+    <p:push dir="r"/>
+  </p:transition>
   <p:timing>
     <p:tnLst>
       <p:par>
@@ -11536,6 +11615,9 @@
   <p:clrMapOvr>
     <a:masterClrMapping/>
   </p:clrMapOvr>
+  <p:transition>
+    <p:push dir="r"/>
+  </p:transition>
   <p:timing>
     <p:tnLst>
       <p:par>
@@ -11740,6 +11822,9 @@
   <p:clrMapOvr>
     <a:masterClrMapping/>
   </p:clrMapOvr>
+  <p:transition>
+    <p:push dir="r"/>
+  </p:transition>
   <p:timing>
     <p:tnLst>
       <p:par>
@@ -11961,6 +12046,9 @@
   <p:clrMapOvr>
     <a:masterClrMapping/>
   </p:clrMapOvr>
+  <p:transition>
+    <p:newsflash/>
+  </p:transition>
   <p:timing>
     <p:tnLst>
       <p:par>
@@ -12320,6 +12408,9 @@
   <p:clrMapOvr>
     <a:masterClrMapping/>
   </p:clrMapOvr>
+  <p:transition>
+    <p:push dir="r"/>
+  </p:transition>
   <p:timing>
     <p:tnLst>
       <p:par>
@@ -12522,6 +12613,9 @@
   <p:clrMapOvr>
     <a:masterClrMapping/>
   </p:clrMapOvr>
+  <p:transition>
+    <p:push dir="r"/>
+  </p:transition>
   <p:timing>
     <p:tnLst>
       <p:par>
@@ -12784,6 +12878,9 @@
   <p:clrMapOvr>
     <a:masterClrMapping/>
   </p:clrMapOvr>
+  <p:transition>
+    <p:push dir="r"/>
+  </p:transition>
   <p:timing>
     <p:tnLst>
       <p:par>
@@ -13356,6 +13453,9 @@
   <p:clrMapOvr>
     <a:masterClrMapping/>
   </p:clrMapOvr>
+  <p:transition>
+    <p:newsflash/>
+  </p:transition>
   <p:timing>
     <p:tnLst>
       <p:par>
@@ -13599,6 +13699,9 @@
   <p:clrMapOvr>
     <a:masterClrMapping/>
   </p:clrMapOvr>
+  <p:transition>
+    <p:push dir="r"/>
+  </p:transition>
   <p:timing>
     <p:tnLst>
       <p:par>
@@ -13965,6 +14068,47 @@
               <a:t>Destinatarios</a:t>
             </a:r>
           </a:p>
+          <a:p>
+            <a:pPr marL="0" marR="0" lvl="0" indent="0" defTabSz="914400" rtl="0" eaLnBrk="1" fontAlgn="auto" latinLnBrk="0" hangingPunct="1">
+              <a:lnSpc>
+                <a:spcPct val="100000"/>
+              </a:lnSpc>
+              <a:spcBef>
+                <a:spcPct val="0"/>
+              </a:spcBef>
+              <a:spcAft>
+                <a:spcPts val="0"/>
+              </a:spcAft>
+              <a:buClrTx/>
+              <a:buSzTx/>
+              <a:buFont typeface="Arial" pitchFamily="34" charset="0"/>
+              <a:buChar char="•"/>
+              <a:tabLst/>
+              <a:defRPr/>
+            </a:pPr>
+            <a:r>
+              <a:rPr lang="es-ES" sz="4800" dirty="0" smtClean="0">
+                <a:latin typeface="+mj-lt"/>
+                <a:ea typeface="+mj-ea"/>
+                <a:cs typeface="+mj-cs"/>
+              </a:rPr>
+              <a:t>Competencia</a:t>
+            </a:r>
+            <a:endParaRPr kumimoji="0" lang="es-ES" sz="4800" b="0" i="0" u="none" strike="noStrike" kern="1200" cap="none" spc="0" normalizeH="0" baseline="0" dirty="0" smtClean="0">
+              <a:ln>
+                <a:noFill/>
+              </a:ln>
+              <a:solidFill>
+                <a:schemeClr val="tx1"/>
+              </a:solidFill>
+              <a:effectLst/>
+              <a:uLnTx/>
+              <a:uFillTx/>
+              <a:latin typeface="+mj-lt"/>
+              <a:ea typeface="+mj-ea"/>
+              <a:cs typeface="+mj-cs"/>
+            </a:endParaRPr>
+          </a:p>
         </p:txBody>
       </p:sp>
     </p:spTree>
@@ -13972,6 +14116,9 @@
   <p:clrMapOvr>
     <a:masterClrMapping/>
   </p:clrMapOvr>
+  <p:transition>
+    <p:push dir="r"/>
+  </p:transition>
   <p:timing>
     <p:tnLst>
       <p:par>
@@ -14687,6 +14834,9 @@
   <p:clrMapOvr>
     <a:masterClrMapping/>
   </p:clrMapOvr>
+  <p:transition>
+    <p:push dir="r"/>
+  </p:transition>
   <p:timing>
     <p:tnLst>
       <p:par>
@@ -14953,6 +15103,9 @@
   <p:clrMapOvr>
     <a:masterClrMapping/>
   </p:clrMapOvr>
+  <p:transition>
+    <p:push dir="r"/>
+  </p:transition>
   <p:timing>
     <p:tnLst>
       <p:par>
@@ -15590,6 +15743,9 @@
   <p:clrMapOvr>
     <a:masterClrMapping/>
   </p:clrMapOvr>
+  <p:transition>
+    <p:push dir="r"/>
+  </p:transition>
   <p:timing>
     <p:tnLst>
       <p:par>
@@ -15788,6 +15944,9 @@
   <p:clrMapOvr>
     <a:masterClrMapping/>
   </p:clrMapOvr>
+  <p:transition>
+    <p:newsflash/>
+  </p:transition>
   <p:timing>
     <p:tnLst>
       <p:par>
@@ -15948,6 +16107,9 @@
   <p:clrMapOvr>
     <a:masterClrMapping/>
   </p:clrMapOvr>
+  <p:transition>
+    <p:push dir="r"/>
+  </p:transition>
   <p:timing>
     <p:tnLst>
       <p:par>
@@ -16115,6 +16277,9 @@
   <p:clrMapOvr>
     <a:masterClrMapping/>
   </p:clrMapOvr>
+  <p:transition>
+    <p:push dir="r"/>
+  </p:transition>
   <p:timing>
     <p:tnLst>
       <p:par>
@@ -16282,6 +16447,9 @@
   <p:clrMapOvr>
     <a:masterClrMapping/>
   </p:clrMapOvr>
+  <p:transition>
+    <p:push dir="r"/>
+  </p:transition>
   <p:timing>
     <p:tnLst>
       <p:par>
@@ -16442,6 +16610,9 @@
   <p:clrMapOvr>
     <a:masterClrMapping/>
   </p:clrMapOvr>
+  <p:transition>
+    <p:push dir="r"/>
+  </p:transition>
   <p:timing>
     <p:tnLst>
       <p:par>
@@ -16939,6 +17110,9 @@
   <p:clrMapOvr>
     <a:masterClrMapping/>
   </p:clrMapOvr>
+  <p:transition>
+    <p:newsflash/>
+  </p:transition>
   <p:timing>
     <p:tnLst>
       <p:par>
@@ -17138,6 +17312,9 @@
   <p:clrMapOvr>
     <a:masterClrMapping/>
   </p:clrMapOvr>
+  <p:transition>
+    <p:push dir="r"/>
+  </p:transition>
   <p:timing>
     <p:tnLst>
       <p:par>
@@ -17450,6 +17627,9 @@
   <p:clrMapOvr>
     <a:masterClrMapping/>
   </p:clrMapOvr>
+  <p:transition>
+    <p:push dir="r"/>
+  </p:transition>
   <p:timing>
     <p:tnLst>
       <p:par>
@@ -17684,6 +17864,211 @@
   <p:clrMapOvr>
     <a:masterClrMapping/>
   </p:clrMapOvr>
+  <p:transition>
+    <p:newsflash/>
+  </p:transition>
+  <p:timing>
+    <p:tnLst>
+      <p:par>
+        <p:cTn id="1" dur="indefinite" restart="never" nodeType="tmRoot"/>
+      </p:par>
+    </p:tnLst>
+  </p:timing>
+</p:sld>
+</file>
+
+<file path=ppt/slides/slide52.xml><?xml version="1.0" encoding="utf-8"?>
+<p:sld xmlns:a="http://schemas.openxmlformats.org/drawingml/2006/main" xmlns:r="http://schemas.openxmlformats.org/officeDocument/2006/relationships" xmlns:p="http://schemas.openxmlformats.org/presentationml/2006/main">
+  <p:cSld>
+    <p:spTree>
+      <p:nvGrpSpPr>
+        <p:cNvPr id="1" name=""/>
+        <p:cNvGrpSpPr/>
+        <p:nvPr/>
+      </p:nvGrpSpPr>
+      <p:grpSpPr>
+        <a:xfrm>
+          <a:off x="0" y="0"/>
+          <a:ext cx="0" cy="0"/>
+          <a:chOff x="0" y="0"/>
+          <a:chExt cx="0" cy="0"/>
+        </a:xfrm>
+      </p:grpSpPr>
+      <p:sp>
+        <p:nvSpPr>
+          <p:cNvPr id="4" name="1 Título"/>
+          <p:cNvSpPr txBox="1">
+            <a:spLocks/>
+          </p:cNvSpPr>
+          <p:nvPr/>
+        </p:nvSpPr>
+        <p:spPr>
+          <a:xfrm>
+            <a:off x="0" y="0"/>
+            <a:ext cx="9144000" cy="857248"/>
+          </a:xfrm>
+          <a:prstGeom prst="rect">
+            <a:avLst/>
+          </a:prstGeom>
+        </p:spPr>
+        <p:txBody>
+          <a:bodyPr vert="horz" lIns="91440" tIns="45720" rIns="91440" bIns="45720" rtlCol="0" anchor="ctr">
+            <a:normAutofit/>
+          </a:bodyPr>
+          <a:lstStyle/>
+          <a:p>
+            <a:pPr marL="0" marR="0" lvl="0" indent="0" algn="ctr" defTabSz="914400" rtl="0" eaLnBrk="1" fontAlgn="auto" latinLnBrk="0" hangingPunct="1">
+              <a:lnSpc>
+                <a:spcPct val="100000"/>
+              </a:lnSpc>
+              <a:spcBef>
+                <a:spcPct val="0"/>
+              </a:spcBef>
+              <a:spcAft>
+                <a:spcPts val="0"/>
+              </a:spcAft>
+              <a:buClrTx/>
+              <a:buSzTx/>
+              <a:buFontTx/>
+              <a:buNone/>
+              <a:tabLst/>
+              <a:defRPr/>
+            </a:pPr>
+            <a:r>
+              <a:rPr lang="es-ES" sz="4400" dirty="0" smtClean="0">
+                <a:latin typeface="Underwood Champion" pitchFamily="2" charset="0"/>
+                <a:ea typeface="+mj-ea"/>
+                <a:cs typeface="+mj-cs"/>
+              </a:rPr>
+              <a:t>EOF</a:t>
+            </a:r>
+            <a:endParaRPr lang="es-ES" sz="4400" dirty="0" smtClean="0">
+              <a:latin typeface="Underwood Champion" pitchFamily="2" charset="0"/>
+              <a:ea typeface="+mj-ea"/>
+              <a:cs typeface="+mj-cs"/>
+            </a:endParaRPr>
+          </a:p>
+        </p:txBody>
+      </p:sp>
+      <p:sp>
+        <p:nvSpPr>
+          <p:cNvPr id="3" name="1 Título"/>
+          <p:cNvSpPr txBox="1">
+            <a:spLocks/>
+          </p:cNvSpPr>
+          <p:nvPr/>
+        </p:nvSpPr>
+        <p:spPr>
+          <a:xfrm>
+            <a:off x="1285852" y="1142984"/>
+            <a:ext cx="6572296" cy="4572032"/>
+          </a:xfrm>
+          <a:prstGeom prst="rect">
+            <a:avLst/>
+          </a:prstGeom>
+        </p:spPr>
+        <p:txBody>
+          <a:bodyPr vert="horz" lIns="91440" tIns="45720" rIns="91440" bIns="45720" rtlCol="0" anchor="ctr">
+            <a:normAutofit/>
+          </a:bodyPr>
+          <a:lstStyle/>
+          <a:p>
+            <a:pPr marL="0" marR="0" lvl="0" indent="0" algn="ctr" defTabSz="914400" rtl="0" eaLnBrk="1" fontAlgn="auto" latinLnBrk="0" hangingPunct="1">
+              <a:lnSpc>
+                <a:spcPct val="100000"/>
+              </a:lnSpc>
+              <a:spcBef>
+                <a:spcPct val="0"/>
+              </a:spcBef>
+              <a:spcAft>
+                <a:spcPts val="0"/>
+              </a:spcAft>
+              <a:buClrTx/>
+              <a:buSzTx/>
+              <a:tabLst/>
+              <a:defRPr/>
+            </a:pPr>
+            <a:r>
+              <a:rPr lang="es-ES" sz="4000" dirty="0" smtClean="0">
+                <a:ea typeface="+mj-ea"/>
+                <a:cs typeface="+mj-cs"/>
+              </a:rPr>
+              <a:t>Muchas gracias</a:t>
+            </a:r>
+            <a:endParaRPr lang="es-ES" sz="4000" dirty="0" smtClean="0">
+              <a:ea typeface="+mj-ea"/>
+              <a:cs typeface="+mj-cs"/>
+            </a:endParaRPr>
+          </a:p>
+          <a:p>
+            <a:pPr marL="0" marR="0" lvl="0" indent="0" algn="ctr" defTabSz="914400" rtl="0" eaLnBrk="1" fontAlgn="auto" latinLnBrk="0" hangingPunct="1">
+              <a:lnSpc>
+                <a:spcPct val="100000"/>
+              </a:lnSpc>
+              <a:spcBef>
+                <a:spcPct val="0"/>
+              </a:spcBef>
+              <a:spcAft>
+                <a:spcPts val="0"/>
+              </a:spcAft>
+              <a:buClrTx/>
+              <a:buSzTx/>
+              <a:tabLst/>
+              <a:defRPr/>
+            </a:pPr>
+            <a:r>
+              <a:rPr lang="es-ES" sz="4000" dirty="0" smtClean="0">
+                <a:ea typeface="+mj-ea"/>
+                <a:cs typeface="+mj-cs"/>
+              </a:rPr>
+              <a:t>por la</a:t>
+            </a:r>
+          </a:p>
+          <a:p>
+            <a:pPr marL="0" marR="0" lvl="0" indent="0" algn="ctr" defTabSz="914400" rtl="0" eaLnBrk="1" fontAlgn="auto" latinLnBrk="0" hangingPunct="1">
+              <a:lnSpc>
+                <a:spcPct val="100000"/>
+              </a:lnSpc>
+              <a:spcBef>
+                <a:spcPct val="0"/>
+              </a:spcBef>
+              <a:spcAft>
+                <a:spcPts val="0"/>
+              </a:spcAft>
+              <a:buClrTx/>
+              <a:buSzTx/>
+              <a:tabLst/>
+              <a:defRPr/>
+            </a:pPr>
+            <a:r>
+              <a:rPr lang="es-ES" sz="4000" dirty="0" smtClean="0">
+                <a:ea typeface="+mj-ea"/>
+                <a:cs typeface="+mj-cs"/>
+              </a:rPr>
+              <a:t>a</a:t>
+            </a:r>
+            <a:r>
+              <a:rPr lang="es-ES" sz="4000" dirty="0" smtClean="0">
+                <a:ea typeface="+mj-ea"/>
+                <a:cs typeface="+mj-cs"/>
+              </a:rPr>
+              <a:t>tención prestada.</a:t>
+            </a:r>
+            <a:endParaRPr lang="es-ES" sz="4000" dirty="0" smtClean="0">
+              <a:ea typeface="+mj-ea"/>
+              <a:cs typeface="+mj-cs"/>
+            </a:endParaRPr>
+          </a:p>
+        </p:txBody>
+      </p:sp>
+    </p:spTree>
+  </p:cSld>
+  <p:clrMapOvr>
+    <a:masterClrMapping/>
+  </p:clrMapOvr>
+  <p:transition>
+    <p:newsflash/>
+  </p:transition>
   <p:timing>
     <p:tnLst>
       <p:par>
@@ -18170,6 +18555,9 @@
   <p:clrMapOvr>
     <a:masterClrMapping/>
   </p:clrMapOvr>
+  <p:transition>
+    <p:push dir="r"/>
+  </p:transition>
   <p:timing>
     <p:tnLst>
       <p:par>
@@ -18661,6 +19049,9 @@
   <p:clrMapOvr>
     <a:masterClrMapping/>
   </p:clrMapOvr>
+  <p:transition>
+    <p:push dir="r"/>
+  </p:transition>
   <p:timing>
     <p:tnLst>
       <p:par>
@@ -19027,6 +19418,9 @@
   <p:clrMapOvr>
     <a:masterClrMapping/>
   </p:clrMapOvr>
+  <p:transition>
+    <p:newsflash/>
+  </p:transition>
   <p:timing>
     <p:tnLst>
       <p:par>
@@ -19498,6 +19892,9 @@
   <p:clrMapOvr>
     <a:masterClrMapping/>
   </p:clrMapOvr>
+  <p:transition>
+    <p:push dir="r"/>
+  </p:transition>
   <p:timing>
     <p:tnLst>
       <p:par>

</xml_diff>